<commit_message>
inclusao de comportamento para demo
</commit_message>
<xml_diff>
--- a/SOLID.pptx
+++ b/SOLID.pptx
@@ -12,10 +12,10 @@
     <p:sldId id="266" r:id="rId6"/>
     <p:sldId id="259" r:id="rId7"/>
     <p:sldId id="260" r:id="rId8"/>
-    <p:sldId id="262" r:id="rId9"/>
-    <p:sldId id="263" r:id="rId10"/>
-    <p:sldId id="261" r:id="rId11"/>
-    <p:sldId id="264" r:id="rId12"/>
+    <p:sldId id="267" r:id="rId9"/>
+    <p:sldId id="262" r:id="rId10"/>
+    <p:sldId id="263" r:id="rId11"/>
+    <p:sldId id="261" r:id="rId12"/>
   </p:sldIdLst>
   <p:sldSz cx="12192000" cy="6858000"/>
   <p:notesSz cx="6858000" cy="9144000"/>
@@ -360,7 +360,7 @@
           <a:p>
             <a:fld id="{ED291B17-9318-49DB-B28B-6E5994AE9581}" type="datetime1">
               <a:rPr lang="en-US" smtClean="0"/>
-              <a:t>2/24/2020</a:t>
+              <a:t>3/5/2020</a:t>
             </a:fld>
             <a:endParaRPr lang="en-US" dirty="0"/>
           </a:p>
@@ -563,7 +563,7 @@
           <a:p>
             <a:fld id="{2CED4963-E985-44C4-B8C4-FDD613B7C2F8}" type="datetime1">
               <a:rPr lang="en-US" smtClean="0"/>
-              <a:t>2/24/2020</a:t>
+              <a:t>3/5/2020</a:t>
             </a:fld>
             <a:endParaRPr lang="en-US" dirty="0"/>
           </a:p>
@@ -925,7 +925,7 @@
           <a:p>
             <a:fld id="{ED291B17-9318-49DB-B28B-6E5994AE9581}" type="datetime1">
               <a:rPr lang="en-US" smtClean="0"/>
-              <a:t>2/24/2020</a:t>
+              <a:t>3/5/2020</a:t>
             </a:fld>
             <a:endParaRPr lang="en-US" dirty="0"/>
           </a:p>
@@ -1123,7 +1123,7 @@
           <a:p>
             <a:fld id="{78DD82B9-B8EE-4375-B6FF-88FA6ABB15D9}" type="datetime1">
               <a:rPr lang="en-US" smtClean="0"/>
-              <a:t>2/24/2020</a:t>
+              <a:t>3/5/2020</a:t>
             </a:fld>
             <a:endParaRPr lang="en-US" dirty="0"/>
           </a:p>
@@ -1435,7 +1435,7 @@
           <a:p>
             <a:fld id="{B2497495-0637-405E-AE64-5CC7506D51F5}" type="datetime1">
               <a:rPr lang="en-US" smtClean="0"/>
-              <a:t>2/24/2020</a:t>
+              <a:t>3/5/2020</a:t>
             </a:fld>
             <a:endParaRPr lang="en-US" dirty="0"/>
           </a:p>
@@ -1688,7 +1688,7 @@
           <a:p>
             <a:fld id="{7BFFD690-9426-415D-8B65-26881E07B2D4}" type="datetime1">
               <a:rPr lang="en-US" smtClean="0"/>
-              <a:t>2/24/2020</a:t>
+              <a:t>3/5/2020</a:t>
             </a:fld>
             <a:endParaRPr lang="en-US" dirty="0"/>
           </a:p>
@@ -2110,7 +2110,7 @@
           <a:p>
             <a:fld id="{04C4989A-474C-40DE-95B9-011C28B71673}" type="datetime1">
               <a:rPr lang="en-US" smtClean="0"/>
-              <a:t>2/24/2020</a:t>
+              <a:t>3/5/2020</a:t>
             </a:fld>
             <a:endParaRPr lang="en-US" dirty="0"/>
           </a:p>
@@ -2233,7 +2233,7 @@
           <a:p>
             <a:fld id="{5DB4ED54-5B5E-4A04-93D3-5772E3CE3818}" type="datetime1">
               <a:rPr lang="en-US" smtClean="0"/>
-              <a:t>2/24/2020</a:t>
+              <a:t>3/5/2020</a:t>
             </a:fld>
             <a:endParaRPr lang="en-US" dirty="0"/>
           </a:p>
@@ -2328,7 +2328,7 @@
           <a:p>
             <a:fld id="{4EDE50D6-574B-40AF-946F-D52A04ADE379}" type="datetime1">
               <a:rPr lang="en-US" smtClean="0"/>
-              <a:t>2/24/2020</a:t>
+              <a:t>3/5/2020</a:t>
             </a:fld>
             <a:endParaRPr lang="en-US" dirty="0"/>
           </a:p>
@@ -2705,7 +2705,7 @@
           <a:p>
             <a:fld id="{D82884F1-FFEA-405F-9602-3DCA865EDA4E}" type="datetime1">
               <a:rPr lang="en-US" smtClean="0"/>
-              <a:t>2/24/2020</a:t>
+              <a:t>3/5/2020</a:t>
             </a:fld>
             <a:endParaRPr lang="en-US" dirty="0"/>
           </a:p>
@@ -2998,7 +2998,7 @@
           <a:p>
             <a:fld id="{7E18DB4A-8810-4A10-AD5C-D5E2C667F5B3}" type="datetime1">
               <a:rPr lang="en-US" smtClean="0"/>
-              <a:t>2/24/2020</a:t>
+              <a:t>3/5/2020</a:t>
             </a:fld>
             <a:endParaRPr lang="en-US" dirty="0"/>
           </a:p>
@@ -3213,7 +3213,7 @@
           <a:p>
             <a:fld id="{ED291B17-9318-49DB-B28B-6E5994AE9581}" type="datetime1">
               <a:rPr lang="en-US" smtClean="0"/>
-              <a:t>2/24/2020</a:t>
+              <a:t>3/5/2020</a:t>
             </a:fld>
             <a:endParaRPr lang="en-US" dirty="0"/>
           </a:p>
@@ -4197,7 +4197,7 @@
           <p:cNvPr id="2" name="Título 1">
             <a:extLst>
               <a:ext uri="{FF2B5EF4-FFF2-40B4-BE49-F238E27FC236}">
-                <a16:creationId xmlns:a16="http://schemas.microsoft.com/office/drawing/2014/main" id="{51C220CC-7DCC-43B9-AF3C-A6A13DB25709}"/>
+                <a16:creationId xmlns:a16="http://schemas.microsoft.com/office/drawing/2014/main" id="{F0B1CE50-CF1D-4229-B4CB-BD05D9D1BCB3}"/>
               </a:ext>
             </a:extLst>
           </p:cNvPr>
@@ -4214,36 +4214,24 @@
           <a:lstStyle/>
           <a:p>
             <a:r>
-              <a:rPr lang="en-US" dirty="0" err="1"/>
-              <a:t>Buscar</a:t>
-            </a:r>
-            <a:r>
-              <a:rPr lang="en-US" dirty="0"/>
-              <a:t> o </a:t>
-            </a:r>
-            <a:r>
-              <a:rPr lang="en-US" dirty="0" err="1"/>
-              <a:t>equilibrio</a:t>
-            </a:r>
-            <a:r>
-              <a:rPr lang="en-US" dirty="0"/>
-              <a:t> entre o </a:t>
-            </a:r>
-            <a:r>
-              <a:rPr lang="en-US" dirty="0" err="1"/>
-              <a:t>acoplamento</a:t>
-            </a:r>
-            <a:r>
-              <a:rPr lang="en-US" dirty="0"/>
-              <a:t> e a </a:t>
-            </a:r>
-            <a:r>
-              <a:rPr lang="en-US" dirty="0" err="1"/>
-              <a:t>coesao</a:t>
-            </a:r>
-            <a:r>
-              <a:rPr lang="en-US" dirty="0"/>
-              <a:t> e fundamental</a:t>
+              <a:rPr lang="en-US" dirty="0"/>
+              <a:t>DIP- principio da </a:t>
+            </a:r>
+            <a:r>
+              <a:rPr lang="en-US" dirty="0" err="1"/>
+              <a:t>inversao</a:t>
+            </a:r>
+            <a:r>
+              <a:rPr lang="en-US" dirty="0"/>
+              <a:t> de </a:t>
+            </a:r>
+            <a:r>
+              <a:rPr lang="en-US" dirty="0" err="1"/>
+              <a:t>dependencia</a:t>
+            </a:r>
+            <a:r>
+              <a:rPr lang="en-US" cap="none" dirty="0"/>
+              <a:t> </a:t>
             </a:r>
             <a:endParaRPr lang="pt-BR" dirty="0"/>
           </a:p>
@@ -4254,7 +4242,7 @@
           <p:cNvPr id="3" name="Espaço Reservado para Conteúdo 2">
             <a:extLst>
               <a:ext uri="{FF2B5EF4-FFF2-40B4-BE49-F238E27FC236}">
-                <a16:creationId xmlns:a16="http://schemas.microsoft.com/office/drawing/2014/main" id="{5C61852C-DEB4-4076-AC24-5A9418968883}"/>
+                <a16:creationId xmlns:a16="http://schemas.microsoft.com/office/drawing/2014/main" id="{621A60F4-E704-46C6-9B94-E3BA661637BA}"/>
               </a:ext>
             </a:extLst>
           </p:cNvPr>
@@ -4270,14 +4258,222 @@
           <a:bodyPr/>
           <a:lstStyle/>
           <a:p>
-            <a:endParaRPr lang="pt-BR"/>
+            <a:r>
+              <a:rPr lang="en-US" dirty="0" err="1"/>
+              <a:t>Modulos</a:t>
+            </a:r>
+            <a:r>
+              <a:rPr lang="en-US" dirty="0"/>
+              <a:t> de alto </a:t>
+            </a:r>
+            <a:r>
+              <a:rPr lang="en-US" dirty="0" err="1"/>
+              <a:t>nivel</a:t>
+            </a:r>
+            <a:r>
+              <a:rPr lang="en-US" dirty="0"/>
+              <a:t> </a:t>
+            </a:r>
+            <a:r>
+              <a:rPr lang="en-US" dirty="0" err="1"/>
+              <a:t>nao</a:t>
+            </a:r>
+            <a:r>
+              <a:rPr lang="en-US" dirty="0"/>
+              <a:t> </a:t>
+            </a:r>
+            <a:r>
+              <a:rPr lang="en-US" dirty="0" err="1"/>
+              <a:t>devem</a:t>
+            </a:r>
+            <a:r>
+              <a:rPr lang="en-US" dirty="0"/>
+              <a:t> </a:t>
+            </a:r>
+            <a:r>
+              <a:rPr lang="en-US" dirty="0" err="1"/>
+              <a:t>depender</a:t>
+            </a:r>
+            <a:r>
+              <a:rPr lang="en-US" dirty="0"/>
+              <a:t> de </a:t>
+            </a:r>
+            <a:r>
+              <a:rPr lang="en-US" dirty="0" err="1"/>
+              <a:t>modulos</a:t>
+            </a:r>
+            <a:r>
+              <a:rPr lang="en-US" dirty="0"/>
+              <a:t> de </a:t>
+            </a:r>
+            <a:r>
+              <a:rPr lang="en-US" dirty="0" err="1"/>
+              <a:t>baixo</a:t>
+            </a:r>
+            <a:r>
+              <a:rPr lang="en-US" dirty="0"/>
+              <a:t> </a:t>
+            </a:r>
+            <a:r>
+              <a:rPr lang="en-US" dirty="0" err="1"/>
+              <a:t>nivel</a:t>
+            </a:r>
+            <a:r>
+              <a:rPr lang="en-US" dirty="0"/>
+              <a:t>. Ambos </a:t>
+            </a:r>
+            <a:r>
+              <a:rPr lang="en-US" dirty="0" err="1"/>
+              <a:t>devem</a:t>
+            </a:r>
+            <a:r>
+              <a:rPr lang="en-US" dirty="0"/>
+              <a:t> </a:t>
+            </a:r>
+            <a:r>
+              <a:rPr lang="en-US" dirty="0" err="1"/>
+              <a:t>depender</a:t>
+            </a:r>
+            <a:r>
+              <a:rPr lang="en-US" dirty="0"/>
+              <a:t> de </a:t>
+            </a:r>
+            <a:r>
+              <a:rPr lang="en-US" dirty="0" err="1"/>
+              <a:t>abstracoes</a:t>
+            </a:r>
+            <a:r>
+              <a:rPr lang="en-US" dirty="0"/>
+              <a:t>.</a:t>
+            </a:r>
+          </a:p>
+          <a:p>
+            <a:r>
+              <a:rPr lang="en-US" dirty="0" err="1"/>
+              <a:t>Abstracoes</a:t>
+            </a:r>
+            <a:r>
+              <a:rPr lang="en-US" dirty="0"/>
+              <a:t> </a:t>
+            </a:r>
+            <a:r>
+              <a:rPr lang="en-US" dirty="0" err="1"/>
+              <a:t>nao</a:t>
+            </a:r>
+            <a:r>
+              <a:rPr lang="en-US" dirty="0"/>
+              <a:t> </a:t>
+            </a:r>
+            <a:r>
+              <a:rPr lang="en-US" dirty="0" err="1"/>
+              <a:t>devem</a:t>
+            </a:r>
+            <a:r>
+              <a:rPr lang="en-US" dirty="0"/>
+              <a:t> </a:t>
+            </a:r>
+            <a:r>
+              <a:rPr lang="en-US" dirty="0" err="1"/>
+              <a:t>depender</a:t>
+            </a:r>
+            <a:r>
+              <a:rPr lang="en-US" dirty="0"/>
+              <a:t> de </a:t>
+            </a:r>
+            <a:r>
+              <a:rPr lang="en-US" dirty="0" err="1"/>
+              <a:t>detalhes</a:t>
+            </a:r>
+            <a:r>
+              <a:rPr lang="en-US" dirty="0"/>
+              <a:t>. </a:t>
+            </a:r>
+            <a:r>
+              <a:rPr lang="en-US" dirty="0" err="1"/>
+              <a:t>Detalhes</a:t>
+            </a:r>
+            <a:r>
+              <a:rPr lang="en-US" dirty="0"/>
+              <a:t> </a:t>
+            </a:r>
+            <a:r>
+              <a:rPr lang="en-US" dirty="0" err="1"/>
+              <a:t>devem</a:t>
+            </a:r>
+            <a:r>
+              <a:rPr lang="en-US" dirty="0"/>
+              <a:t> </a:t>
+            </a:r>
+            <a:r>
+              <a:rPr lang="en-US" dirty="0" err="1"/>
+              <a:t>depender</a:t>
+            </a:r>
+            <a:r>
+              <a:rPr lang="en-US" dirty="0"/>
+              <a:t> de </a:t>
+            </a:r>
+            <a:r>
+              <a:rPr lang="en-US" dirty="0" err="1"/>
+              <a:t>abstracoes</a:t>
+            </a:r>
+            <a:r>
+              <a:rPr lang="en-US" dirty="0"/>
+              <a:t>.</a:t>
+            </a:r>
+          </a:p>
+          <a:p>
+            <a:r>
+              <a:rPr lang="en-US" dirty="0" err="1"/>
+              <a:t>Dependa</a:t>
+            </a:r>
+            <a:r>
+              <a:rPr lang="en-US" dirty="0"/>
+              <a:t> de </a:t>
+            </a:r>
+            <a:r>
+              <a:rPr lang="en-US" dirty="0" err="1"/>
+              <a:t>uma</a:t>
+            </a:r>
+            <a:r>
+              <a:rPr lang="en-US" dirty="0"/>
+              <a:t> </a:t>
+            </a:r>
+            <a:r>
+              <a:rPr lang="en-US" dirty="0" err="1"/>
+              <a:t>abstracao</a:t>
+            </a:r>
+            <a:r>
+              <a:rPr lang="en-US" dirty="0"/>
+              <a:t> e </a:t>
+            </a:r>
+            <a:r>
+              <a:rPr lang="en-US" dirty="0" err="1"/>
+              <a:t>nao</a:t>
+            </a:r>
+            <a:r>
+              <a:rPr lang="en-US" dirty="0"/>
+              <a:t> de </a:t>
+            </a:r>
+            <a:r>
+              <a:rPr lang="en-US" dirty="0" err="1"/>
+              <a:t>uma</a:t>
+            </a:r>
+            <a:r>
+              <a:rPr lang="en-US" dirty="0"/>
+              <a:t> </a:t>
+            </a:r>
+            <a:r>
+              <a:rPr lang="en-US" dirty="0" err="1"/>
+              <a:t>implementacao</a:t>
+            </a:r>
+            <a:endParaRPr lang="en-US" dirty="0"/>
           </a:p>
         </p:txBody>
       </p:sp>
     </p:spTree>
     <p:extLst>
       <p:ext uri="{BB962C8B-B14F-4D97-AF65-F5344CB8AC3E}">
-        <p14:creationId xmlns:p14="http://schemas.microsoft.com/office/powerpoint/2010/main" val="3018678545"/>
+        <p14:creationId xmlns:p14="http://schemas.microsoft.com/office/powerpoint/2010/main" val="910581432"/>
       </p:ext>
     </p:extLst>
   </p:cSld>
@@ -4309,7 +4505,7 @@
           <p:cNvPr id="2" name="Título 1">
             <a:extLst>
               <a:ext uri="{FF2B5EF4-FFF2-40B4-BE49-F238E27FC236}">
-                <a16:creationId xmlns:a16="http://schemas.microsoft.com/office/drawing/2014/main" id="{98C6155E-30BB-431C-B2F7-9989CD5EE07C}"/>
+                <a16:creationId xmlns:a16="http://schemas.microsoft.com/office/drawing/2014/main" id="{51C220CC-7DCC-43B9-AF3C-A6A13DB25709}"/>
               </a:ext>
             </a:extLst>
           </p:cNvPr>
@@ -4325,7 +4521,39 @@
           <a:bodyPr/>
           <a:lstStyle/>
           <a:p>
-            <a:endParaRPr lang="pt-BR"/>
+            <a:r>
+              <a:rPr lang="en-US" dirty="0" err="1"/>
+              <a:t>Buscar</a:t>
+            </a:r>
+            <a:r>
+              <a:rPr lang="en-US" dirty="0"/>
+              <a:t> o </a:t>
+            </a:r>
+            <a:r>
+              <a:rPr lang="en-US" dirty="0" err="1"/>
+              <a:t>equilibrio</a:t>
+            </a:r>
+            <a:r>
+              <a:rPr lang="en-US" dirty="0"/>
+              <a:t> entre o </a:t>
+            </a:r>
+            <a:r>
+              <a:rPr lang="en-US" dirty="0" err="1"/>
+              <a:t>acoplamento</a:t>
+            </a:r>
+            <a:r>
+              <a:rPr lang="en-US" dirty="0"/>
+              <a:t> e a </a:t>
+            </a:r>
+            <a:r>
+              <a:rPr lang="en-US" dirty="0" err="1"/>
+              <a:t>coesao</a:t>
+            </a:r>
+            <a:r>
+              <a:rPr lang="en-US" dirty="0"/>
+              <a:t> e fundamental</a:t>
+            </a:r>
+            <a:endParaRPr lang="pt-BR" dirty="0"/>
           </a:p>
         </p:txBody>
       </p:sp>
@@ -4334,7 +4562,7 @@
           <p:cNvPr id="3" name="Espaço Reservado para Conteúdo 2">
             <a:extLst>
               <a:ext uri="{FF2B5EF4-FFF2-40B4-BE49-F238E27FC236}">
-                <a16:creationId xmlns:a16="http://schemas.microsoft.com/office/drawing/2014/main" id="{6D2D3B2A-86D5-4A44-B9FC-BDB77294FB52}"/>
+                <a16:creationId xmlns:a16="http://schemas.microsoft.com/office/drawing/2014/main" id="{5C61852C-DEB4-4076-AC24-5A9418968883}"/>
               </a:ext>
             </a:extLst>
           </p:cNvPr>
@@ -4357,7 +4585,7 @@
     </p:spTree>
     <p:extLst>
       <p:ext uri="{BB962C8B-B14F-4D97-AF65-F5344CB8AC3E}">
-        <p14:creationId xmlns:p14="http://schemas.microsoft.com/office/powerpoint/2010/main" val="768225479"/>
+        <p14:creationId xmlns:p14="http://schemas.microsoft.com/office/powerpoint/2010/main" val="3018678545"/>
       </p:ext>
     </p:extLst>
   </p:cSld>
@@ -6111,7 +6339,7 @@
           <p:cNvPr id="2" name="Título 1">
             <a:extLst>
               <a:ext uri="{FF2B5EF4-FFF2-40B4-BE49-F238E27FC236}">
-                <a16:creationId xmlns:a16="http://schemas.microsoft.com/office/drawing/2014/main" id="{2EE9F02E-C9B2-4EFF-9AC4-AA19183D928B}"/>
+                <a16:creationId xmlns:a16="http://schemas.microsoft.com/office/drawing/2014/main" id="{4E8787BF-25C1-4A8B-8140-B4AD7EFBE68C}"/>
               </a:ext>
             </a:extLst>
           </p:cNvPr>
@@ -6124,34 +6352,33 @@
         </p:nvSpPr>
         <p:spPr/>
         <p:txBody>
-          <a:bodyPr>
-            <a:normAutofit/>
-          </a:bodyPr>
+          <a:bodyPr/>
           <a:lstStyle/>
           <a:p>
             <a:r>
-              <a:rPr lang="en-US" dirty="0"/>
-              <a:t>ISP – principio da </a:t>
-            </a:r>
-            <a:r>
-              <a:rPr lang="en-US" dirty="0" err="1"/>
-              <a:t>substituicao</a:t>
-            </a:r>
-            <a:r>
-              <a:rPr lang="en-US" dirty="0"/>
+              <a:rPr lang="en-US" cap="none" dirty="0"/>
+              <a:t>LSP - </a:t>
+            </a:r>
+            <a:r>
+              <a:rPr lang="en-US" cap="none" dirty="0" err="1"/>
+              <a:t>Princípio</a:t>
+            </a:r>
+            <a:r>
+              <a:rPr lang="en-US" cap="none" dirty="0"/>
+              <a:t> da </a:t>
+            </a:r>
+            <a:r>
+              <a:rPr lang="en-US" cap="none" dirty="0" err="1"/>
+              <a:t>substituição</a:t>
+            </a:r>
+            <a:r>
+              <a:rPr lang="en-US" cap="none" dirty="0"/>
               <a:t> de </a:t>
             </a:r>
             <a:r>
-              <a:rPr lang="en-US" dirty="0" err="1"/>
-              <a:t>liskov</a:t>
-            </a:r>
-            <a:r>
-              <a:rPr lang="en-US" cap="none" dirty="0"/>
-              <a:t> </a:t>
-            </a:r>
-            <a:br>
-              <a:rPr lang="en-US" dirty="0"/>
-            </a:br>
+              <a:rPr lang="en-US" cap="none" dirty="0" err="1"/>
+              <a:t>Liskov</a:t>
+            </a:r>
             <a:endParaRPr lang="pt-BR" dirty="0"/>
           </a:p>
         </p:txBody>
@@ -6161,7 +6388,7 @@
           <p:cNvPr id="3" name="Espaço Reservado para Conteúdo 2">
             <a:extLst>
               <a:ext uri="{FF2B5EF4-FFF2-40B4-BE49-F238E27FC236}">
-                <a16:creationId xmlns:a16="http://schemas.microsoft.com/office/drawing/2014/main" id="{AF915D87-3960-4C47-93E1-82AE4190CA26}"/>
+                <a16:creationId xmlns:a16="http://schemas.microsoft.com/office/drawing/2014/main" id="{6159D791-9740-4C7F-B191-BA8629630825}"/>
               </a:ext>
             </a:extLst>
           </p:cNvPr>
@@ -6178,20 +6405,8 @@
           <a:lstStyle/>
           <a:p>
             <a:r>
-              <a:rPr lang="en-US" dirty="0" err="1"/>
-              <a:t>Clientes</a:t>
-            </a:r>
-            <a:r>
-              <a:rPr lang="en-US" dirty="0"/>
-              <a:t> </a:t>
-            </a:r>
-            <a:r>
-              <a:rPr lang="en-US" dirty="0" err="1"/>
-              <a:t>nao</a:t>
-            </a:r>
-            <a:r>
-              <a:rPr lang="en-US" dirty="0"/>
-              <a:t> </a:t>
+              <a:rPr lang="en-US" dirty="0"/>
+              <a:t>Subclasses </a:t>
             </a:r>
             <a:r>
               <a:rPr lang="en-US" dirty="0" err="1"/>
@@ -6203,90 +6418,20 @@
             </a:r>
             <a:r>
               <a:rPr lang="en-US" dirty="0" err="1"/>
-              <a:t>forcados</a:t>
-            </a:r>
-            <a:r>
-              <a:rPr lang="en-US" dirty="0"/>
-              <a:t> a </a:t>
-            </a:r>
-            <a:r>
-              <a:rPr lang="en-US" dirty="0" err="1"/>
-              <a:t>depender</a:t>
-            </a:r>
-            <a:r>
-              <a:rPr lang="en-US" dirty="0"/>
-              <a:t> de </a:t>
-            </a:r>
-            <a:r>
-              <a:rPr lang="en-US" dirty="0" err="1"/>
-              <a:t>metodos</a:t>
-            </a:r>
-            <a:r>
-              <a:rPr lang="en-US" dirty="0"/>
-              <a:t> que </a:t>
-            </a:r>
-            <a:r>
-              <a:rPr lang="en-US" dirty="0" err="1"/>
-              <a:t>nao</a:t>
-            </a:r>
-            <a:r>
-              <a:rPr lang="en-US" dirty="0"/>
-              <a:t> </a:t>
-            </a:r>
-            <a:r>
-              <a:rPr lang="en-US" dirty="0" err="1"/>
-              <a:t>usam</a:t>
-            </a:r>
-            <a:endParaRPr lang="en-US" dirty="0"/>
-          </a:p>
-          <a:p>
-            <a:r>
-              <a:rPr lang="en-US" dirty="0" err="1"/>
-              <a:t>Muitas</a:t>
-            </a:r>
-            <a:r>
-              <a:rPr lang="en-US" dirty="0"/>
-              <a:t> interfaces </a:t>
-            </a:r>
-            <a:r>
-              <a:rPr lang="en-US" dirty="0" err="1"/>
-              <a:t>especificas</a:t>
-            </a:r>
-            <a:r>
-              <a:rPr lang="en-US" dirty="0"/>
-              <a:t> </a:t>
-            </a:r>
-            <a:r>
-              <a:rPr lang="en-US" dirty="0" err="1"/>
-              <a:t>sao</a:t>
-            </a:r>
-            <a:r>
-              <a:rPr lang="en-US" dirty="0"/>
-              <a:t> </a:t>
-            </a:r>
-            <a:r>
-              <a:rPr lang="en-US" dirty="0" err="1"/>
-              <a:t>melhores</a:t>
-            </a:r>
-            <a:r>
-              <a:rPr lang="en-US" dirty="0"/>
-              <a:t> do que </a:t>
-            </a:r>
-            <a:r>
-              <a:rPr lang="en-US" dirty="0" err="1"/>
-              <a:t>uma</a:t>
-            </a:r>
-            <a:r>
-              <a:rPr lang="en-US" dirty="0"/>
-              <a:t> interface </a:t>
-            </a:r>
-            <a:r>
-              <a:rPr lang="en-US" dirty="0" err="1"/>
-              <a:t>unica</a:t>
-            </a:r>
-            <a:endParaRPr lang="en-US" dirty="0"/>
-          </a:p>
-          <a:p>
+              <a:t>substituidas</a:t>
+            </a:r>
+            <a:r>
+              <a:rPr lang="en-US" dirty="0"/>
+              <a:t> por </a:t>
+            </a:r>
+            <a:r>
+              <a:rPr lang="en-US" dirty="0" err="1"/>
+              <a:t>suas</a:t>
+            </a:r>
+            <a:r>
+              <a:rPr lang="en-US" dirty="0"/>
+              <a:t> classes bases.</a:t>
+            </a:r>
             <a:endParaRPr lang="pt-BR" dirty="0"/>
           </a:p>
         </p:txBody>
@@ -6294,7 +6439,7 @@
     </p:spTree>
     <p:extLst>
       <p:ext uri="{BB962C8B-B14F-4D97-AF65-F5344CB8AC3E}">
-        <p14:creationId xmlns:p14="http://schemas.microsoft.com/office/powerpoint/2010/main" val="3322351413"/>
+        <p14:creationId xmlns:p14="http://schemas.microsoft.com/office/powerpoint/2010/main" val="879654223"/>
       </p:ext>
     </p:extLst>
   </p:cSld>
@@ -6326,7 +6471,7 @@
           <p:cNvPr id="2" name="Título 1">
             <a:extLst>
               <a:ext uri="{FF2B5EF4-FFF2-40B4-BE49-F238E27FC236}">
-                <a16:creationId xmlns:a16="http://schemas.microsoft.com/office/drawing/2014/main" id="{F0B1CE50-CF1D-4229-B4CB-BD05D9D1BCB3}"/>
+                <a16:creationId xmlns:a16="http://schemas.microsoft.com/office/drawing/2014/main" id="{2EE9F02E-C9B2-4EFF-9AC4-AA19183D928B}"/>
               </a:ext>
             </a:extLst>
           </p:cNvPr>
@@ -6339,29 +6484,34 @@
         </p:nvSpPr>
         <p:spPr/>
         <p:txBody>
-          <a:bodyPr/>
+          <a:bodyPr>
+            <a:normAutofit/>
+          </a:bodyPr>
           <a:lstStyle/>
           <a:p>
             <a:r>
               <a:rPr lang="en-US" dirty="0"/>
-              <a:t>DIP- principio da </a:t>
-            </a:r>
-            <a:r>
-              <a:rPr lang="en-US" dirty="0" err="1"/>
-              <a:t>inversao</a:t>
-            </a:r>
-            <a:r>
-              <a:rPr lang="en-US" dirty="0"/>
-              <a:t> de </a:t>
-            </a:r>
-            <a:r>
-              <a:rPr lang="en-US" dirty="0" err="1"/>
-              <a:t>dependencia</a:t>
+              <a:t>ISP – </a:t>
+            </a:r>
+            <a:r>
+              <a:rPr lang="en-US" cap="none" dirty="0" err="1"/>
+              <a:t>Princípio</a:t>
             </a:r>
             <a:r>
               <a:rPr lang="en-US" cap="none" dirty="0"/>
-              <a:t> </a:t>
-            </a:r>
+              <a:t> da </a:t>
+            </a:r>
+            <a:r>
+              <a:rPr lang="en-US" cap="none" dirty="0" err="1"/>
+              <a:t>segregação</a:t>
+            </a:r>
+            <a:r>
+              <a:rPr lang="en-US" cap="none" dirty="0"/>
+              <a:t> de interface </a:t>
+            </a:r>
+            <a:br>
+              <a:rPr lang="en-US" dirty="0"/>
+            </a:br>
             <a:endParaRPr lang="pt-BR" dirty="0"/>
           </a:p>
         </p:txBody>
@@ -6371,7 +6521,7 @@
           <p:cNvPr id="3" name="Espaço Reservado para Conteúdo 2">
             <a:extLst>
               <a:ext uri="{FF2B5EF4-FFF2-40B4-BE49-F238E27FC236}">
-                <a16:creationId xmlns:a16="http://schemas.microsoft.com/office/drawing/2014/main" id="{621A60F4-E704-46C6-9B94-E3BA661637BA}"/>
+                <a16:creationId xmlns:a16="http://schemas.microsoft.com/office/drawing/2014/main" id="{AF915D87-3960-4C47-93E1-82AE4190CA26}"/>
               </a:ext>
             </a:extLst>
           </p:cNvPr>
@@ -6389,15 +6539,7 @@
           <a:p>
             <a:r>
               <a:rPr lang="en-US" dirty="0" err="1"/>
-              <a:t>Modulos</a:t>
-            </a:r>
-            <a:r>
-              <a:rPr lang="en-US" dirty="0"/>
-              <a:t> de alto </a:t>
-            </a:r>
-            <a:r>
-              <a:rPr lang="en-US" dirty="0" err="1"/>
-              <a:t>nivel</a:t>
+              <a:t>Clientes</a:t>
             </a:r>
             <a:r>
               <a:rPr lang="en-US" dirty="0"/>
@@ -6417,27 +6559,58 @@
             </a:r>
             <a:r>
               <a:rPr lang="en-US" dirty="0"/>
+              <a:t> ser </a:t>
+            </a:r>
+            <a:r>
+              <a:rPr lang="en-US" dirty="0" err="1"/>
+              <a:t>forcados</a:t>
+            </a:r>
+            <a:r>
+              <a:rPr lang="en-US" dirty="0"/>
+              <a:t> a </a:t>
+            </a:r>
+            <a:r>
+              <a:rPr lang="en-US" dirty="0" err="1"/>
+              <a:t>depender</a:t>
+            </a:r>
+            <a:r>
+              <a:rPr lang="en-US" dirty="0"/>
+              <a:t> de </a:t>
+            </a:r>
+            <a:r>
+              <a:rPr lang="en-US" dirty="0" err="1"/>
+              <a:t>metodos</a:t>
+            </a:r>
+            <a:r>
+              <a:rPr lang="en-US" dirty="0"/>
+              <a:t> que </a:t>
+            </a:r>
+            <a:r>
+              <a:rPr lang="en-US" dirty="0" err="1"/>
+              <a:t>nao</a:t>
+            </a:r>
+            <a:r>
+              <a:rPr lang="en-US" dirty="0"/>
               <a:t> </a:t>
             </a:r>
             <a:r>
               <a:rPr lang="en-US" dirty="0" err="1"/>
-              <a:t>depender</a:t>
-            </a:r>
-            <a:r>
-              <a:rPr lang="en-US" dirty="0"/>
-              <a:t> de </a:t>
-            </a:r>
-            <a:r>
-              <a:rPr lang="en-US" dirty="0" err="1"/>
-              <a:t>modulos</a:t>
-            </a:r>
-            <a:r>
-              <a:rPr lang="en-US" dirty="0"/>
-              <a:t> de </a:t>
-            </a:r>
-            <a:r>
-              <a:rPr lang="en-US" dirty="0" err="1"/>
-              <a:t>baixo</a:t>
+              <a:t>usam</a:t>
+            </a:r>
+            <a:endParaRPr lang="en-US" dirty="0"/>
+          </a:p>
+          <a:p>
+            <a:r>
+              <a:rPr lang="en-US" dirty="0" err="1"/>
+              <a:t>Muitas</a:t>
+            </a:r>
+            <a:r>
+              <a:rPr lang="en-US" dirty="0"/>
+              <a:t> interfaces </a:t>
+            </a:r>
+            <a:r>
+              <a:rPr lang="en-US" dirty="0" err="1"/>
+              <a:t>especificas</a:t>
             </a:r>
             <a:r>
               <a:rPr lang="en-US" dirty="0"/>
@@ -6445,15 +6618,7 @@
             </a:r>
             <a:r>
               <a:rPr lang="en-US" dirty="0" err="1"/>
-              <a:t>nivel</a:t>
-            </a:r>
-            <a:r>
-              <a:rPr lang="en-US" dirty="0"/>
-              <a:t>. Ambos </a:t>
-            </a:r>
-            <a:r>
-              <a:rPr lang="en-US" dirty="0" err="1"/>
-              <a:t>devem</a:t>
+              <a:t>sao</a:t>
             </a:r>
             <a:r>
               <a:rPr lang="en-US" dirty="0"/>
@@ -6461,103 +6626,11 @@
             </a:r>
             <a:r>
               <a:rPr lang="en-US" dirty="0" err="1"/>
-              <a:t>depender</a:t>
-            </a:r>
-            <a:r>
-              <a:rPr lang="en-US" dirty="0"/>
-              <a:t> de </a:t>
-            </a:r>
-            <a:r>
-              <a:rPr lang="en-US" dirty="0" err="1"/>
-              <a:t>abstracoes</a:t>
-            </a:r>
-            <a:r>
-              <a:rPr lang="en-US" dirty="0"/>
-              <a:t>.</a:t>
-            </a:r>
-          </a:p>
-          <a:p>
-            <a:r>
-              <a:rPr lang="en-US" dirty="0" err="1"/>
-              <a:t>Abstracoes</a:t>
-            </a:r>
-            <a:r>
-              <a:rPr lang="en-US" dirty="0"/>
-              <a:t> </a:t>
-            </a:r>
-            <a:r>
-              <a:rPr lang="en-US" dirty="0" err="1"/>
-              <a:t>nao</a:t>
-            </a:r>
-            <a:r>
-              <a:rPr lang="en-US" dirty="0"/>
-              <a:t> </a:t>
-            </a:r>
-            <a:r>
-              <a:rPr lang="en-US" dirty="0" err="1"/>
-              <a:t>devem</a:t>
-            </a:r>
-            <a:r>
-              <a:rPr lang="en-US" dirty="0"/>
-              <a:t> </a:t>
-            </a:r>
-            <a:r>
-              <a:rPr lang="en-US" dirty="0" err="1"/>
-              <a:t>depender</a:t>
-            </a:r>
-            <a:r>
-              <a:rPr lang="en-US" dirty="0"/>
-              <a:t> de </a:t>
-            </a:r>
-            <a:r>
-              <a:rPr lang="en-US" dirty="0" err="1"/>
-              <a:t>detalhes</a:t>
-            </a:r>
-            <a:r>
-              <a:rPr lang="en-US" dirty="0"/>
-              <a:t>. </a:t>
-            </a:r>
-            <a:r>
-              <a:rPr lang="en-US" dirty="0" err="1"/>
-              <a:t>Detalhes</a:t>
-            </a:r>
-            <a:r>
-              <a:rPr lang="en-US" dirty="0"/>
-              <a:t> </a:t>
-            </a:r>
-            <a:r>
-              <a:rPr lang="en-US" dirty="0" err="1"/>
-              <a:t>devem</a:t>
-            </a:r>
-            <a:r>
-              <a:rPr lang="en-US" dirty="0"/>
-              <a:t> </a:t>
-            </a:r>
-            <a:r>
-              <a:rPr lang="en-US" dirty="0" err="1"/>
-              <a:t>depender</a:t>
-            </a:r>
-            <a:r>
-              <a:rPr lang="en-US" dirty="0"/>
-              <a:t> de </a:t>
-            </a:r>
-            <a:r>
-              <a:rPr lang="en-US" dirty="0" err="1"/>
-              <a:t>abstracoes</a:t>
-            </a:r>
-            <a:r>
-              <a:rPr lang="en-US" dirty="0"/>
-              <a:t>.</a:t>
-            </a:r>
-          </a:p>
-          <a:p>
-            <a:r>
-              <a:rPr lang="en-US" dirty="0" err="1"/>
-              <a:t>Dependa</a:t>
-            </a:r>
-            <a:r>
-              <a:rPr lang="en-US" dirty="0"/>
-              <a:t> de </a:t>
+              <a:t>melhores</a:t>
+            </a:r>
+            <a:r>
+              <a:rPr lang="en-US" dirty="0"/>
+              <a:t> do que </a:t>
             </a:r>
             <a:r>
               <a:rPr lang="en-US" dirty="0" err="1"/>
@@ -6565,44 +6638,23 @@
             </a:r>
             <a:r>
               <a:rPr lang="en-US" dirty="0"/>
-              <a:t> </a:t>
-            </a:r>
-            <a:r>
-              <a:rPr lang="en-US" dirty="0" err="1"/>
-              <a:t>abstracao</a:t>
-            </a:r>
-            <a:r>
-              <a:rPr lang="en-US" dirty="0"/>
-              <a:t> e </a:t>
-            </a:r>
-            <a:r>
-              <a:rPr lang="en-US" dirty="0" err="1"/>
-              <a:t>nao</a:t>
-            </a:r>
-            <a:r>
-              <a:rPr lang="en-US" dirty="0"/>
-              <a:t> de </a:t>
-            </a:r>
-            <a:r>
-              <a:rPr lang="en-US" dirty="0" err="1"/>
-              <a:t>uma</a:t>
-            </a:r>
-            <a:r>
-              <a:rPr lang="en-US" dirty="0"/>
-              <a:t> </a:t>
-            </a:r>
-            <a:r>
-              <a:rPr lang="en-US" dirty="0" err="1"/>
-              <a:t>implementacao</a:t>
-            </a:r>
-            <a:endParaRPr lang="en-US" dirty="0"/>
+              <a:t> interface </a:t>
+            </a:r>
+            <a:r>
+              <a:rPr lang="en-US" dirty="0" err="1"/>
+              <a:t>unica</a:t>
+            </a:r>
+            <a:endParaRPr lang="en-US" dirty="0"/>
+          </a:p>
+          <a:p>
+            <a:endParaRPr lang="pt-BR" dirty="0"/>
           </a:p>
         </p:txBody>
       </p:sp>
     </p:spTree>
     <p:extLst>
       <p:ext uri="{BB962C8B-B14F-4D97-AF65-F5344CB8AC3E}">
-        <p14:creationId xmlns:p14="http://schemas.microsoft.com/office/powerpoint/2010/main" val="910581432"/>
+        <p14:creationId xmlns:p14="http://schemas.microsoft.com/office/powerpoint/2010/main" val="3322351413"/>
       </p:ext>
     </p:extLst>
   </p:cSld>

</xml_diff>